<commit_message>
Updated ppt, removed log lines, added elasticsearch DSL scripts
</commit_message>
<xml_diff>
--- a/presentation/Elasticsearch-meetup-2019-03.pptx
+++ b/presentation/Elasticsearch-meetup-2019-03.pptx
@@ -5,10 +5,10 @@
     <p:sldMasterId id="2147483648" r:id="rId1"/>
   </p:sldMasterIdLst>
   <p:notesMasterIdLst>
-    <p:notesMasterId r:id="rId11"/>
+    <p:notesMasterId r:id="rId12"/>
   </p:notesMasterIdLst>
   <p:handoutMasterIdLst>
-    <p:handoutMasterId r:id="rId12"/>
+    <p:handoutMasterId r:id="rId13"/>
   </p:handoutMasterIdLst>
   <p:sldIdLst>
     <p:sldId id="334" r:id="rId2"/>
@@ -20,6 +20,7 @@
     <p:sldId id="342" r:id="rId8"/>
     <p:sldId id="343" r:id="rId9"/>
     <p:sldId id="345" r:id="rId10"/>
+    <p:sldId id="346" r:id="rId11"/>
   </p:sldIdLst>
   <p:sldSz cx="12192000" cy="6858000"/>
   <p:notesSz cx="6858000" cy="9144000"/>
@@ -1114,6 +1115,67 @@
               <a:rPr lang="en-US" smtClean="0"/>
               <a:t>H2 database</a:t>
             </a:r>
+            <a:endParaRPr lang="en-US" dirty="0"/>
+          </a:p>
+        </p:txBody>
+      </p:sp>
+    </p:spTree>
+    <p:extLst>
+      <p:ext uri="{BB962C8B-B14F-4D97-AF65-F5344CB8AC3E}">
+        <p14:creationId xmlns:p14="http://schemas.microsoft.com/office/powerpoint/2010/main" val="3628581786"/>
+      </p:ext>
+    </p:extLst>
+  </p:cSld>
+  <p:clrMapOvr>
+    <a:masterClrMapping/>
+  </p:clrMapOvr>
+</p:notes>
+</file>
+
+<file path=ppt/notesSlides/notesSlide4.xml><?xml version="1.0" encoding="utf-8"?>
+<p:notes xmlns:a="http://schemas.openxmlformats.org/drawingml/2006/main" xmlns:r="http://schemas.openxmlformats.org/officeDocument/2006/relationships" xmlns:p="http://schemas.openxmlformats.org/presentationml/2006/main">
+  <p:cSld>
+    <p:spTree>
+      <p:nvGrpSpPr>
+        <p:cNvPr id="1" name=""/>
+        <p:cNvGrpSpPr/>
+        <p:nvPr/>
+      </p:nvGrpSpPr>
+      <p:grpSpPr>
+        <a:xfrm>
+          <a:off x="0" y="0"/>
+          <a:ext cx="0" cy="0"/>
+          <a:chOff x="0" y="0"/>
+          <a:chExt cx="0" cy="0"/>
+        </a:xfrm>
+      </p:grpSpPr>
+      <p:sp>
+        <p:nvSpPr>
+          <p:cNvPr id="2" name="Tijdelijke aanduiding voor dia-afbeelding 1"/>
+          <p:cNvSpPr>
+            <a:spLocks noGrp="1" noRot="1" noChangeAspect="1"/>
+          </p:cNvSpPr>
+          <p:nvPr>
+            <p:ph type="sldImg"/>
+          </p:nvPr>
+        </p:nvSpPr>
+        <p:spPr/>
+      </p:sp>
+      <p:sp>
+        <p:nvSpPr>
+          <p:cNvPr id="3" name="Tijdelijke aanduiding voor notities 2"/>
+          <p:cNvSpPr>
+            <a:spLocks noGrp="1"/>
+          </p:cNvSpPr>
+          <p:nvPr>
+            <p:ph type="body" idx="1"/>
+          </p:nvPr>
+        </p:nvSpPr>
+        <p:spPr/>
+        <p:txBody>
+          <a:bodyPr/>
+          <a:lstStyle/>
+          <a:p>
             <a:endParaRPr lang="en-US" dirty="0"/>
           </a:p>
         </p:txBody>
@@ -3793,6 +3855,290 @@
 </p:sld>
 </file>
 
+<file path=ppt/slides/slide10.xml><?xml version="1.0" encoding="utf-8"?>
+<p:sld xmlns:a="http://schemas.openxmlformats.org/drawingml/2006/main" xmlns:r="http://schemas.openxmlformats.org/officeDocument/2006/relationships" xmlns:p="http://schemas.openxmlformats.org/presentationml/2006/main">
+  <p:cSld>
+    <p:spTree>
+      <p:nvGrpSpPr>
+        <p:cNvPr id="1" name=""/>
+        <p:cNvGrpSpPr/>
+        <p:nvPr/>
+      </p:nvGrpSpPr>
+      <p:grpSpPr>
+        <a:xfrm>
+          <a:off x="0" y="0"/>
+          <a:ext cx="0" cy="0"/>
+          <a:chOff x="0" y="0"/>
+          <a:chExt cx="0" cy="0"/>
+        </a:xfrm>
+      </p:grpSpPr>
+      <p:sp>
+        <p:nvSpPr>
+          <p:cNvPr id="2" name="Titel 1"/>
+          <p:cNvSpPr>
+            <a:spLocks noGrp="1"/>
+          </p:cNvSpPr>
+          <p:nvPr>
+            <p:ph type="title"/>
+          </p:nvPr>
+        </p:nvSpPr>
+        <p:spPr/>
+        <p:txBody>
+          <a:bodyPr/>
+          <a:lstStyle/>
+          <a:p>
+            <a:r>
+              <a:rPr lang="en-US" dirty="0" smtClean="0"/>
+              <a:t>Example system, the making </a:t>
+            </a:r>
+            <a:r>
+              <a:rPr lang="en-US" dirty="0" smtClean="0"/>
+              <a:t>continued</a:t>
+            </a:r>
+            <a:r>
+              <a:rPr lang="en-US" dirty="0" smtClean="0"/>
+              <a:t>.</a:t>
+            </a:r>
+            <a:r>
+              <a:rPr lang="en-US" dirty="0" smtClean="0"/>
+              <a:t>.</a:t>
+            </a:r>
+            <a:endParaRPr lang="en-US" dirty="0"/>
+          </a:p>
+        </p:txBody>
+      </p:sp>
+      <p:sp>
+        <p:nvSpPr>
+          <p:cNvPr id="4" name="Tijdelijke aanduiding voor inhoud 3"/>
+          <p:cNvSpPr>
+            <a:spLocks noGrp="1"/>
+          </p:cNvSpPr>
+          <p:nvPr>
+            <p:ph sz="quarter" idx="11"/>
+          </p:nvPr>
+        </p:nvSpPr>
+        <p:spPr/>
+        <p:txBody>
+          <a:bodyPr/>
+          <a:lstStyle/>
+          <a:p>
+            <a:r>
+              <a:rPr lang="en-US" dirty="0" err="1" smtClean="0"/>
+              <a:t>Elasticsearch</a:t>
+            </a:r>
+            <a:r>
+              <a:rPr lang="en-US" dirty="0" smtClean="0"/>
+              <a:t> </a:t>
+            </a:r>
+            <a:r>
+              <a:rPr lang="en-US" dirty="0" err="1" smtClean="0"/>
+              <a:t>Meetup</a:t>
+            </a:r>
+            <a:endParaRPr lang="en-US" dirty="0"/>
+          </a:p>
+        </p:txBody>
+      </p:sp>
+      <p:sp>
+        <p:nvSpPr>
+          <p:cNvPr id="5" name="Tijdelijke aanduiding voor tekst 4"/>
+          <p:cNvSpPr>
+            <a:spLocks noGrp="1"/>
+          </p:cNvSpPr>
+          <p:nvPr>
+            <p:ph type="body" sz="quarter" idx="12"/>
+          </p:nvPr>
+        </p:nvSpPr>
+        <p:spPr>
+          <a:xfrm>
+            <a:off x="3936000" y="1881248"/>
+            <a:ext cx="8136664" cy="3780000"/>
+          </a:xfrm>
+        </p:spPr>
+        <p:txBody>
+          <a:bodyPr/>
+          <a:lstStyle/>
+          <a:p>
+            <a:pPr marL="342900" indent="-342900">
+              <a:buFont typeface="Arial"/>
+              <a:buChar char="•"/>
+            </a:pPr>
+            <a:r>
+              <a:rPr lang="en-US" sz="2000" dirty="0" smtClean="0"/>
+              <a:t>Import </a:t>
+            </a:r>
+            <a:r>
+              <a:rPr lang="en-US" sz="2000" dirty="0" err="1" smtClean="0"/>
+              <a:t>csv</a:t>
+            </a:r>
+            <a:r>
+              <a:rPr lang="en-US" sz="2000" dirty="0" smtClean="0"/>
+              <a:t> data in </a:t>
+            </a:r>
+            <a:r>
+              <a:rPr lang="en-US" sz="2000" dirty="0" err="1" smtClean="0"/>
+              <a:t>Elasticsearch</a:t>
+            </a:r>
+            <a:r>
+              <a:rPr lang="en-US" sz="2000" dirty="0" smtClean="0"/>
+              <a:t> with model mapping</a:t>
+            </a:r>
+          </a:p>
+          <a:p>
+            <a:pPr marL="342900" indent="-342900">
+              <a:buFont typeface="Arial"/>
+              <a:buChar char="•"/>
+            </a:pPr>
+            <a:r>
+              <a:rPr lang="en-US" sz="2000" dirty="0" err="1" smtClean="0"/>
+              <a:t>Analyse</a:t>
+            </a:r>
+            <a:r>
+              <a:rPr lang="en-US" sz="2000" dirty="0" smtClean="0"/>
+              <a:t> what we have by default</a:t>
+            </a:r>
+          </a:p>
+          <a:p>
+            <a:pPr marL="342900" indent="-342900">
+              <a:buFont typeface="Arial"/>
+              <a:buChar char="•"/>
+            </a:pPr>
+            <a:r>
+              <a:rPr lang="en-US" sz="2000" dirty="0" smtClean="0"/>
+              <a:t>while True:</a:t>
+            </a:r>
+          </a:p>
+          <a:p>
+            <a:pPr marL="1085850" lvl="1" indent="-342900">
+              <a:buFont typeface="Arial"/>
+              <a:buChar char="•"/>
+            </a:pPr>
+            <a:r>
+              <a:rPr lang="en-US" sz="2300" dirty="0" smtClean="0"/>
+              <a:t>Improve mappings and settings and </a:t>
+            </a:r>
+            <a:r>
+              <a:rPr lang="en-US" sz="2300" dirty="0" err="1" smtClean="0"/>
+              <a:t>reindex</a:t>
+            </a:r>
+            <a:endParaRPr lang="en-US" sz="2300" dirty="0" smtClean="0"/>
+          </a:p>
+          <a:p>
+            <a:pPr marL="1085850" lvl="1" indent="-342900">
+              <a:buFont typeface="Arial"/>
+              <a:buChar char="•"/>
+            </a:pPr>
+            <a:r>
+              <a:rPr lang="en-US" sz="2300" dirty="0" smtClean="0"/>
+              <a:t>Search and aggregate</a:t>
+            </a:r>
+            <a:endParaRPr lang="en-US" sz="2300" dirty="0"/>
+          </a:p>
+          <a:p>
+            <a:pPr marL="342900" indent="-342900">
+              <a:buFont typeface="Arial"/>
+              <a:buChar char="•"/>
+            </a:pPr>
+            <a:r>
+              <a:rPr lang="en-US" sz="2000" dirty="0" smtClean="0"/>
+              <a:t>No downtime during </a:t>
+            </a:r>
+            <a:r>
+              <a:rPr lang="en-US" sz="2000" dirty="0" err="1" smtClean="0"/>
+              <a:t>reindex</a:t>
+            </a:r>
+            <a:r>
+              <a:rPr lang="en-US" sz="2000" dirty="0" smtClean="0"/>
+              <a:t>: </a:t>
+            </a:r>
+          </a:p>
+          <a:p>
+            <a:pPr marL="1085850" lvl="1" indent="-342900">
+              <a:buFont typeface="Arial"/>
+              <a:buChar char="•"/>
+            </a:pPr>
+            <a:r>
+              <a:rPr lang="en-US" sz="2300" dirty="0" smtClean="0"/>
+              <a:t>aliases</a:t>
+            </a:r>
+          </a:p>
+          <a:p>
+            <a:pPr marL="1085850" lvl="1" indent="-342900">
+              <a:buFont typeface="Arial"/>
+              <a:buChar char="•"/>
+            </a:pPr>
+            <a:r>
+              <a:rPr lang="en-US" sz="2300" dirty="0" smtClean="0"/>
+              <a:t>scale up and down</a:t>
+            </a:r>
+          </a:p>
+          <a:p>
+            <a:pPr marL="1085850" lvl="1" indent="-342900">
+              <a:buFont typeface="Arial"/>
+              <a:buChar char="•"/>
+            </a:pPr>
+            <a:r>
+              <a:rPr lang="en-US" sz="2300" dirty="0" smtClean="0"/>
+              <a:t>shards, replicas</a:t>
+            </a:r>
+          </a:p>
+          <a:p>
+            <a:pPr marL="342900" indent="-342900">
+              <a:buFont typeface="Arial"/>
+              <a:buChar char="•"/>
+            </a:pPr>
+            <a:r>
+              <a:rPr lang="en-US" sz="2000" dirty="0" smtClean="0"/>
+              <a:t>Templates</a:t>
+            </a:r>
+            <a:endParaRPr lang="en-US" sz="2000" dirty="0" smtClean="0"/>
+          </a:p>
+        </p:txBody>
+      </p:sp>
+      <p:pic>
+        <p:nvPicPr>
+          <p:cNvPr id="10" name="Tijdelijke aanduiding voor afbeelding 8" descr="filmstrip.jpg"/>
+          <p:cNvPicPr>
+            <a:picLocks noGrp="1" noChangeAspect="1"/>
+          </p:cNvPicPr>
+          <p:nvPr>
+            <p:ph type="pic" idx="10"/>
+          </p:nvPr>
+        </p:nvPicPr>
+        <p:blipFill>
+          <a:blip r:embed="rId3" cstate="print">
+            <a:extLst>
+              <a:ext uri="{28A0092B-C50C-407E-A947-70E740481C1C}">
+                <a14:useLocalDpi xmlns:a14="http://schemas.microsoft.com/office/drawing/2010/main"/>
+              </a:ext>
+            </a:extLst>
+          </a:blip>
+          <a:srcRect/>
+          <a:stretch>
+            <a:fillRect/>
+          </a:stretch>
+        </p:blipFill>
+        <p:spPr/>
+      </p:pic>
+    </p:spTree>
+    <p:extLst>
+      <p:ext uri="{BB962C8B-B14F-4D97-AF65-F5344CB8AC3E}">
+        <p14:creationId xmlns:p14="http://schemas.microsoft.com/office/powerpoint/2010/main" val="2082814849"/>
+      </p:ext>
+    </p:extLst>
+  </p:cSld>
+  <p:clrMapOvr>
+    <a:masterClrMapping/>
+  </p:clrMapOvr>
+  <p:timing>
+    <p:tnLst>
+      <p:par>
+        <p:cTn xmlns:p14="http://schemas.microsoft.com/office/powerpoint/2010/main" id="1" dur="indefinite" restart="never" nodeType="tmRoot"/>
+      </p:par>
+    </p:tnLst>
+  </p:timing>
+</p:sld>
+</file>
+
 <file path=ppt/slides/slide2.xml><?xml version="1.0" encoding="utf-8"?>
 <p:sld xmlns:a="http://schemas.openxmlformats.org/drawingml/2006/main" xmlns:r="http://schemas.openxmlformats.org/officeDocument/2006/relationships" xmlns:p="http://schemas.openxmlformats.org/presentationml/2006/main">
   <p:cSld>
@@ -5947,13 +6293,31 @@
             </a:pPr>
             <a:r>
               <a:rPr lang="en-US" sz="2000" dirty="0" smtClean="0"/>
+              <a:t>Must have</a:t>
+            </a:r>
+          </a:p>
+          <a:p>
+            <a:pPr marL="1085850" lvl="1" indent="-342900">
+              <a:buFont typeface="Arial"/>
+              <a:buChar char="•"/>
+            </a:pPr>
+            <a:r>
+              <a:rPr lang="en-US" sz="2300" dirty="0" smtClean="0"/>
               <a:t>Local </a:t>
             </a:r>
             <a:r>
-              <a:rPr lang="en-US" sz="2000" dirty="0" err="1" smtClean="0"/>
+              <a:rPr lang="en-US" sz="2300" dirty="0" err="1" smtClean="0"/>
               <a:t>Elasticsearch</a:t>
             </a:r>
-            <a:endParaRPr lang="en-US" sz="2000" dirty="0" smtClean="0"/>
+            <a:r>
+              <a:rPr lang="en-US" sz="2300" dirty="0" smtClean="0"/>
+              <a:t> and </a:t>
+            </a:r>
+            <a:r>
+              <a:rPr lang="en-US" sz="2300" dirty="0" err="1" smtClean="0"/>
+              <a:t>Kibana</a:t>
+            </a:r>
+            <a:endParaRPr lang="en-US" sz="2300" dirty="0" smtClean="0"/>
           </a:p>
           <a:p>
             <a:pPr marL="342900" indent="-342900">
@@ -5962,8 +6326,88 @@
             </a:pPr>
             <a:r>
               <a:rPr lang="en-US" sz="2000" dirty="0" smtClean="0"/>
-              <a:t>H2 database</a:t>
-            </a:r>
+              <a:t>Should have, </a:t>
+            </a:r>
+            <a:r>
+              <a:rPr lang="en-US" sz="2000" dirty="0"/>
+              <a:t>you need some tooling like an </a:t>
+            </a:r>
+            <a:r>
+              <a:rPr lang="en-US" sz="2000" dirty="0" smtClean="0"/>
+              <a:t>IDE</a:t>
+            </a:r>
+          </a:p>
+          <a:p>
+            <a:pPr marL="1085850" lvl="1" indent="-342900">
+              <a:buFont typeface="Arial"/>
+              <a:buChar char="•"/>
+            </a:pPr>
+            <a:r>
+              <a:rPr lang="en-US" sz="2300" dirty="0" smtClean="0"/>
+              <a:t>Python instead of Java for the fun of it</a:t>
+            </a:r>
+            <a:endParaRPr lang="en-US" sz="2300" dirty="0"/>
+          </a:p>
+          <a:p>
+            <a:pPr marL="1085850" lvl="1" indent="-342900">
+              <a:buFont typeface="Arial"/>
+              <a:buChar char="•"/>
+            </a:pPr>
+            <a:r>
+              <a:rPr lang="en-US" sz="2300" dirty="0" err="1"/>
+              <a:t>PyCharm</a:t>
+            </a:r>
+            <a:r>
+              <a:rPr lang="en-US" sz="2300" dirty="0"/>
+              <a:t> community </a:t>
+            </a:r>
+            <a:r>
+              <a:rPr lang="en-US" sz="2300" dirty="0" smtClean="0"/>
+              <a:t>edition</a:t>
+            </a:r>
+          </a:p>
+          <a:p>
+            <a:pPr marL="1485900" lvl="2" indent="-342900">
+              <a:buFont typeface="Arial"/>
+              <a:buChar char="•"/>
+            </a:pPr>
+            <a:r>
+              <a:rPr lang="en-US" sz="2000" dirty="0" smtClean="0"/>
+              <a:t>pandas, </a:t>
+            </a:r>
+            <a:r>
+              <a:rPr lang="en-US" sz="2000" dirty="0" err="1" smtClean="0"/>
+              <a:t>csv</a:t>
+            </a:r>
+            <a:r>
+              <a:rPr lang="en-US" sz="2000" dirty="0" smtClean="0"/>
+              <a:t>, </a:t>
+            </a:r>
+            <a:r>
+              <a:rPr lang="en-US" sz="2000" dirty="0" err="1" smtClean="0"/>
+              <a:t>jaydebeapi</a:t>
+            </a:r>
+            <a:r>
+              <a:rPr lang="en-US" sz="2000" dirty="0" smtClean="0"/>
+              <a:t>, </a:t>
+            </a:r>
+            <a:r>
+              <a:rPr lang="en-US" sz="2000" dirty="0" err="1" smtClean="0"/>
+              <a:t>elasticsearch</a:t>
+            </a:r>
+            <a:r>
+              <a:rPr lang="en-US" sz="2000" dirty="0" smtClean="0"/>
+              <a:t>, </a:t>
+            </a:r>
+            <a:r>
+              <a:rPr lang="mr-IN" sz="2000" dirty="0" smtClean="0"/>
+              <a:t>…</a:t>
+            </a:r>
+            <a:r>
+              <a:rPr lang="en-US" sz="2000" dirty="0" smtClean="0"/>
+              <a:t> (packages)</a:t>
+            </a:r>
+            <a:endParaRPr lang="en-US" sz="2000" dirty="0" smtClean="0"/>
           </a:p>
           <a:p>
             <a:pPr marL="342900" indent="-342900">
@@ -5971,12 +6415,48 @@
               <a:buChar char="•"/>
             </a:pPr>
             <a:r>
-              <a:rPr lang="en-US" sz="2000" dirty="0" err="1" smtClean="0"/>
+              <a:rPr lang="en-US" sz="2000" dirty="0" smtClean="0"/>
+              <a:t>Optional</a:t>
+            </a:r>
+          </a:p>
+          <a:p>
+            <a:pPr marL="1085850" lvl="1" indent="-342900">
+              <a:buFont typeface="Arial"/>
+              <a:buChar char="•"/>
+            </a:pPr>
+            <a:r>
+              <a:rPr lang="en-US" sz="2300" dirty="0" smtClean="0"/>
+              <a:t>(H2) </a:t>
+            </a:r>
+            <a:r>
+              <a:rPr lang="en-US" sz="2300" dirty="0" smtClean="0"/>
+              <a:t>database</a:t>
+            </a:r>
+          </a:p>
+          <a:p>
+            <a:pPr marL="1085850" lvl="1" indent="-342900">
+              <a:buFont typeface="Arial"/>
+              <a:buChar char="•"/>
+            </a:pPr>
+            <a:r>
+              <a:rPr lang="en-US" sz="2300" dirty="0" smtClean="0"/>
+              <a:t>(</a:t>
+            </a:r>
+            <a:r>
+              <a:rPr lang="en-US" sz="2300" dirty="0" err="1" smtClean="0"/>
               <a:t>DBeaver</a:t>
             </a:r>
             <a:r>
-              <a:rPr lang="en-US" sz="2000" dirty="0" smtClean="0"/>
-              <a:t> as database client</a:t>
+              <a:rPr lang="en-US" sz="2300" dirty="0" smtClean="0"/>
+              <a:t> as) </a:t>
+            </a:r>
+            <a:r>
+              <a:rPr lang="en-US" sz="2300" dirty="0" smtClean="0"/>
+              <a:t>database </a:t>
+            </a:r>
+            <a:r>
+              <a:rPr lang="en-US" sz="2300" dirty="0" smtClean="0"/>
+              <a:t>client</a:t>
             </a:r>
           </a:p>
           <a:p>
@@ -5984,28 +6464,7 @@
               <a:buFont typeface="Arial"/>
               <a:buChar char="•"/>
             </a:pPr>
-            <a:r>
-              <a:rPr lang="en-US" sz="2000" dirty="0" err="1" smtClean="0"/>
-              <a:t>Intellij</a:t>
-            </a:r>
-            <a:r>
-              <a:rPr lang="en-US" sz="2000" dirty="0" smtClean="0"/>
-              <a:t> community edition</a:t>
-            </a:r>
-          </a:p>
-          <a:p>
-            <a:pPr marL="342900" indent="-342900">
-              <a:buFont typeface="Arial"/>
-              <a:buChar char="•"/>
-            </a:pPr>
-            <a:r>
-              <a:rPr lang="en-US" sz="2000" dirty="0" err="1" smtClean="0"/>
-              <a:t>PyCharm</a:t>
-            </a:r>
-            <a:r>
-              <a:rPr lang="en-US" sz="2000" dirty="0" smtClean="0"/>
-              <a:t> community edition</a:t>
-            </a:r>
+            <a:endParaRPr lang="en-US" sz="2000" dirty="0" smtClean="0"/>
           </a:p>
           <a:p>
             <a:pPr marL="342900" indent="-342900">
@@ -6178,31 +6637,15 @@
             </a:pPr>
             <a:r>
               <a:rPr lang="en-US" sz="2000" dirty="0" smtClean="0"/>
-              <a:t>Download and install </a:t>
+              <a:t>Install </a:t>
             </a:r>
             <a:r>
               <a:rPr lang="en-US" sz="2000" dirty="0" err="1" smtClean="0"/>
-              <a:t>DBeaver</a:t>
-            </a:r>
-            <a:r>
-              <a:rPr lang="en-US" sz="2000" dirty="0"/>
-              <a:t> (</a:t>
-            </a:r>
-            <a:r>
-              <a:rPr lang="en-US" sz="2000" dirty="0">
-                <a:hlinkClick r:id="rId3"/>
-              </a:rPr>
-              <a:t>https://dbeaver.io/download</a:t>
-            </a:r>
-            <a:r>
-              <a:rPr lang="en-US" sz="2000" dirty="0" smtClean="0">
-                <a:hlinkClick r:id="rId3"/>
-              </a:rPr>
-              <a:t>/</a:t>
+              <a:t>PyCharm</a:t>
             </a:r>
             <a:r>
               <a:rPr lang="en-US" sz="2000" dirty="0" smtClean="0"/>
-              <a:t>) (done)</a:t>
+              <a:t> (done)</a:t>
             </a:r>
           </a:p>
           <a:p>
@@ -6216,11 +6659,11 @@
             </a:r>
             <a:r>
               <a:rPr lang="en-US" sz="2000" dirty="0" err="1" smtClean="0"/>
-              <a:t>DBeaver</a:t>
+              <a:t>PyCharm</a:t>
             </a:r>
             <a:r>
               <a:rPr lang="en-US" sz="2000" dirty="0" smtClean="0"/>
-              <a:t> and create H2 database</a:t>
+              <a:t> and ETL data to H2 database</a:t>
             </a:r>
           </a:p>
           <a:p>
@@ -6229,16 +6672,26 @@
               <a:buChar char="•"/>
             </a:pPr>
             <a:r>
-              <a:rPr lang="en-US" sz="2000" dirty="0" smtClean="0"/>
-              <a:t>Install </a:t>
-            </a:r>
-            <a:r>
-              <a:rPr lang="en-US" sz="2000" dirty="0" err="1" smtClean="0"/>
-              <a:t>PyCharm</a:t>
-            </a:r>
-            <a:r>
-              <a:rPr lang="en-US" sz="2000" dirty="0" smtClean="0"/>
-              <a:t> (done)</a:t>
+              <a:rPr lang="en-US" sz="2000" dirty="0"/>
+              <a:t>Download and install </a:t>
+            </a:r>
+            <a:r>
+              <a:rPr lang="en-US" sz="2000" dirty="0" err="1"/>
+              <a:t>DBeaver</a:t>
+            </a:r>
+            <a:r>
+              <a:rPr lang="en-US" sz="2000" dirty="0"/>
+              <a:t> (</a:t>
+            </a:r>
+            <a:r>
+              <a:rPr lang="en-US" sz="2000" dirty="0">
+                <a:hlinkClick r:id="rId3"/>
+              </a:rPr>
+              <a:t>https://dbeaver.io/download/</a:t>
+            </a:r>
+            <a:r>
+              <a:rPr lang="en-US" sz="2000" dirty="0"/>
+              <a:t>) (done)</a:t>
             </a:r>
           </a:p>
           <a:p>
@@ -6247,16 +6700,64 @@
               <a:buChar char="•"/>
             </a:pPr>
             <a:r>
+              <a:rPr lang="en-US" sz="2000" dirty="0"/>
+              <a:t>Start </a:t>
+            </a:r>
+            <a:r>
+              <a:rPr lang="en-US" sz="2000" dirty="0" err="1"/>
+              <a:t>DBeaver</a:t>
+            </a:r>
+            <a:r>
+              <a:rPr lang="en-US" sz="2000" dirty="0"/>
+              <a:t> and </a:t>
+            </a:r>
+            <a:r>
               <a:rPr lang="en-US" sz="2000" dirty="0" smtClean="0"/>
-              <a:t>Start </a:t>
+              <a:t>check </a:t>
+            </a:r>
+            <a:r>
+              <a:rPr lang="en-US" sz="2000" dirty="0"/>
+              <a:t>H2 </a:t>
+            </a:r>
+            <a:r>
+              <a:rPr lang="en-US" sz="2000" dirty="0" smtClean="0"/>
+              <a:t>database</a:t>
+            </a:r>
+          </a:p>
+          <a:p>
+            <a:pPr marL="342900" indent="-342900">
+              <a:buFont typeface="Arial"/>
+              <a:buChar char="•"/>
+            </a:pPr>
+            <a:r>
+              <a:rPr lang="en-US" sz="2000" dirty="0" smtClean="0"/>
+              <a:t>Download and install and run </a:t>
             </a:r>
             <a:r>
               <a:rPr lang="en-US" sz="2000" dirty="0" err="1" smtClean="0"/>
-              <a:t>PyCharm</a:t>
+              <a:t>Elasticsearch</a:t>
             </a:r>
             <a:r>
               <a:rPr lang="en-US" sz="2000" dirty="0" smtClean="0"/>
-              <a:t> and ETL data to H2 database</a:t>
+              <a:t> (done)</a:t>
+            </a:r>
+          </a:p>
+          <a:p>
+            <a:pPr marL="342900" indent="-342900">
+              <a:buFont typeface="Arial"/>
+              <a:buChar char="•"/>
+            </a:pPr>
+            <a:r>
+              <a:rPr lang="en-US" sz="2000" dirty="0" smtClean="0"/>
+              <a:t>Download and install and run </a:t>
+            </a:r>
+            <a:r>
+              <a:rPr lang="en-US" sz="2000" dirty="0" err="1" smtClean="0"/>
+              <a:t>Kibana</a:t>
+            </a:r>
+            <a:r>
+              <a:rPr lang="en-US" sz="2000" dirty="0" smtClean="0"/>
+              <a:t> (done)</a:t>
             </a:r>
           </a:p>
           <a:p>

</xml_diff>

<commit_message>
Updated ppt, extra steps in demo
</commit_message>
<xml_diff>
--- a/presentation/Elasticsearch-meetup-2019-03.pptx
+++ b/presentation/Elasticsearch-meetup-2019-03.pptx
@@ -5,10 +5,10 @@
     <p:sldMasterId id="2147483648" r:id="rId1"/>
   </p:sldMasterIdLst>
   <p:notesMasterIdLst>
-    <p:notesMasterId r:id="rId12"/>
+    <p:notesMasterId r:id="rId13"/>
   </p:notesMasterIdLst>
   <p:handoutMasterIdLst>
-    <p:handoutMasterId r:id="rId13"/>
+    <p:handoutMasterId r:id="rId14"/>
   </p:handoutMasterIdLst>
   <p:sldIdLst>
     <p:sldId id="334" r:id="rId2"/>
@@ -21,6 +21,7 @@
     <p:sldId id="343" r:id="rId9"/>
     <p:sldId id="345" r:id="rId10"/>
     <p:sldId id="346" r:id="rId11"/>
+    <p:sldId id="347" r:id="rId12"/>
   </p:sldIdLst>
   <p:sldSz cx="12192000" cy="6858000"/>
   <p:notesSz cx="6858000" cy="9144000"/>
@@ -151,7 +152,7 @@
   </p:defaultTextStyle>
   <p:extLst>
     <p:ext uri="{EFAFB233-063F-42B5-8137-9DF3F51BA10A}">
-      <p15:sldGuideLst xmlns="" xmlns:p15="http://schemas.microsoft.com/office/powerpoint/2012/main">
+      <p15:sldGuideLst xmlns:p15="http://schemas.microsoft.com/office/powerpoint/2012/main" xmlns="">
         <p15:guide id="1" orient="horz" pos="2160" userDrawn="1">
           <p15:clr>
             <a:srgbClr val="A4A3A4"/>
@@ -165,7 +166,7 @@
       </p15:sldGuideLst>
     </p:ext>
     <p:ext uri="{2D200454-40CA-4A62-9FC3-DE9A4176ACB9}">
-      <p15:notesGuideLst xmlns="" xmlns:p15="http://schemas.microsoft.com/office/powerpoint/2012/main"/>
+      <p15:notesGuideLst xmlns:p15="http://schemas.microsoft.com/office/powerpoint/2012/main" xmlns=""/>
     </p:ext>
   </p:extLst>
 </p:presentation>
@@ -280,7 +281,7 @@
               <a:pPr>
                 <a:defRPr/>
               </a:pPr>
-              <a:t>17-03-19</a:t>
+              <a:t>13-04-19</a:t>
             </a:fld>
             <a:endParaRPr lang="nl-NL"/>
           </a:p>
@@ -500,7 +501,7 @@
               <a:pPr>
                 <a:defRPr/>
               </a:pPr>
-              <a:t>17-03-19</a:t>
+              <a:t>13-04-19</a:t>
             </a:fld>
             <a:endParaRPr lang="nl-NL"/>
           </a:p>
@@ -1175,6 +1176,174 @@
         <p:txBody>
           <a:bodyPr/>
           <a:lstStyle/>
+          <a:p>
+            <a:r>
+              <a:rPr lang="en-US" dirty="0" smtClean="0"/>
+              <a:t>example</a:t>
+            </a:r>
+            <a:r>
+              <a:rPr lang="en-US" baseline="0" dirty="0" smtClean="0"/>
+              <a:t> movie Office Space, https://</a:t>
+            </a:r>
+            <a:r>
+              <a:rPr lang="en-US" baseline="0" dirty="0" err="1" smtClean="0"/>
+              <a:t>www.youtube.com</a:t>
+            </a:r>
+            <a:r>
+              <a:rPr lang="en-US" baseline="0" dirty="0" smtClean="0"/>
+              <a:t>/</a:t>
+            </a:r>
+            <a:r>
+              <a:rPr lang="en-US" baseline="0" dirty="0" err="1" smtClean="0"/>
+              <a:t>watch?v</a:t>
+            </a:r>
+            <a:r>
+              <a:rPr lang="en-US" baseline="0" dirty="0" smtClean="0"/>
+              <a:t>=cUOuUX_F_5I</a:t>
+            </a:r>
+          </a:p>
+          <a:p>
+            <a:r>
+              <a:rPr lang="en-US" baseline="0" dirty="0" err="1" smtClean="0"/>
+              <a:t>jennifer</a:t>
+            </a:r>
+            <a:r>
+              <a:rPr lang="en-US" baseline="0" dirty="0" smtClean="0"/>
+              <a:t> </a:t>
+            </a:r>
+            <a:r>
+              <a:rPr lang="en-US" baseline="0" smtClean="0"/>
+              <a:t>aniston</a:t>
+            </a:r>
+          </a:p>
+          <a:p>
+            <a:endParaRPr lang="en-US" dirty="0"/>
+          </a:p>
+        </p:txBody>
+      </p:sp>
+    </p:spTree>
+    <p:extLst>
+      <p:ext uri="{BB962C8B-B14F-4D97-AF65-F5344CB8AC3E}">
+        <p14:creationId xmlns:p14="http://schemas.microsoft.com/office/powerpoint/2010/main" val="3628581786"/>
+      </p:ext>
+    </p:extLst>
+  </p:cSld>
+  <p:clrMapOvr>
+    <a:masterClrMapping/>
+  </p:clrMapOvr>
+</p:notes>
+</file>
+
+<file path=ppt/notesSlides/notesSlide5.xml><?xml version="1.0" encoding="utf-8"?>
+<p:notes xmlns:a="http://schemas.openxmlformats.org/drawingml/2006/main" xmlns:r="http://schemas.openxmlformats.org/officeDocument/2006/relationships" xmlns:p="http://schemas.openxmlformats.org/presentationml/2006/main">
+  <p:cSld>
+    <p:spTree>
+      <p:nvGrpSpPr>
+        <p:cNvPr id="1" name=""/>
+        <p:cNvGrpSpPr/>
+        <p:nvPr/>
+      </p:nvGrpSpPr>
+      <p:grpSpPr>
+        <a:xfrm>
+          <a:off x="0" y="0"/>
+          <a:ext cx="0" cy="0"/>
+          <a:chOff x="0" y="0"/>
+          <a:chExt cx="0" cy="0"/>
+        </a:xfrm>
+      </p:grpSpPr>
+      <p:sp>
+        <p:nvSpPr>
+          <p:cNvPr id="2" name="Tijdelijke aanduiding voor dia-afbeelding 1"/>
+          <p:cNvSpPr>
+            <a:spLocks noGrp="1" noRot="1" noChangeAspect="1"/>
+          </p:cNvSpPr>
+          <p:nvPr>
+            <p:ph type="sldImg"/>
+          </p:nvPr>
+        </p:nvSpPr>
+        <p:spPr/>
+      </p:sp>
+      <p:sp>
+        <p:nvSpPr>
+          <p:cNvPr id="3" name="Tijdelijke aanduiding voor notities 2"/>
+          <p:cNvSpPr>
+            <a:spLocks noGrp="1"/>
+          </p:cNvSpPr>
+          <p:nvPr>
+            <p:ph type="body" idx="1"/>
+          </p:nvPr>
+        </p:nvSpPr>
+        <p:spPr/>
+        <p:txBody>
+          <a:bodyPr/>
+          <a:lstStyle/>
+          <a:p>
+            <a:r>
+              <a:rPr lang="en-US" dirty="0" err="1" smtClean="0"/>
+              <a:t>mkdir</a:t>
+            </a:r>
+            <a:r>
+              <a:rPr lang="en-US" dirty="0" smtClean="0"/>
+              <a:t> elasticsearch-7.0.0b</a:t>
+            </a:r>
+          </a:p>
+          <a:p>
+            <a:r>
+              <a:rPr lang="en-US" dirty="0" smtClean="0"/>
+              <a:t>tar </a:t>
+            </a:r>
+            <a:r>
+              <a:rPr lang="en-US" dirty="0" err="1" smtClean="0"/>
+              <a:t>xvf</a:t>
+            </a:r>
+            <a:r>
+              <a:rPr lang="en-US" dirty="0" smtClean="0"/>
+              <a:t> elasticsearch-7.0.0-darwin-x86_64.tar.gz -C elasticsearch-7.0.0b/ --strip-components=1</a:t>
+            </a:r>
+          </a:p>
+          <a:p>
+            <a:r>
+              <a:rPr lang="en-US" dirty="0" smtClean="0"/>
+              <a:t>cd elasticsearch-7.0.0b</a:t>
+            </a:r>
+          </a:p>
+          <a:p>
+            <a:r>
+              <a:rPr lang="en-US" dirty="0" smtClean="0"/>
+              <a:t>bin/</a:t>
+            </a:r>
+            <a:r>
+              <a:rPr lang="en-US" dirty="0" err="1" smtClean="0"/>
+              <a:t>elasticsearch</a:t>
+            </a:r>
+            <a:endParaRPr lang="en-US" dirty="0" smtClean="0"/>
+          </a:p>
+          <a:p>
+            <a:endParaRPr lang="en-US" dirty="0" smtClean="0"/>
+          </a:p>
+          <a:p>
+            <a:r>
+              <a:rPr lang="en-US" dirty="0" smtClean="0"/>
+              <a:t>set replica to 1</a:t>
+            </a:r>
+          </a:p>
+          <a:p>
+            <a:endParaRPr lang="en-US" dirty="0" smtClean="0"/>
+          </a:p>
+          <a:p>
+            <a:r>
+              <a:rPr lang="en-US" dirty="0" smtClean="0"/>
+              <a:t>stop 1 node, service</a:t>
+            </a:r>
+            <a:r>
+              <a:rPr lang="en-US" baseline="0" dirty="0" smtClean="0"/>
+              <a:t> still available (depending on client connecting to </a:t>
+            </a:r>
+            <a:r>
+              <a:rPr lang="en-US" baseline="0" smtClean="0"/>
+              <a:t>the available node!)</a:t>
+            </a:r>
+          </a:p>
           <a:p>
             <a:endParaRPr lang="en-US" dirty="0"/>
           </a:p>
@@ -3889,19 +4058,7 @@
           <a:p>
             <a:r>
               <a:rPr lang="en-US" dirty="0" smtClean="0"/>
-              <a:t>Example system, the making </a:t>
-            </a:r>
-            <a:r>
-              <a:rPr lang="en-US" dirty="0" smtClean="0"/>
-              <a:t>continued</a:t>
-            </a:r>
-            <a:r>
-              <a:rPr lang="en-US" dirty="0" smtClean="0"/>
-              <a:t>.</a:t>
-            </a:r>
-            <a:r>
-              <a:rPr lang="en-US" dirty="0" smtClean="0"/>
-              <a:t>.</a:t>
+              <a:t>Example system, the making continued..</a:t>
             </a:r>
             <a:endParaRPr lang="en-US" dirty="0"/>
           </a:p>
@@ -4023,6 +4180,33 @@
             <a:endParaRPr lang="en-US" sz="2300" dirty="0" smtClean="0"/>
           </a:p>
           <a:p>
+            <a:pPr marL="1485900" lvl="2" indent="-342900">
+              <a:buFont typeface="Arial"/>
+              <a:buChar char="•"/>
+            </a:pPr>
+            <a:r>
+              <a:rPr lang="en-US" sz="2300" dirty="0" smtClean="0"/>
+              <a:t>types, analyzers</a:t>
+            </a:r>
+            <a:r>
+              <a:rPr lang="en-US" sz="2300" dirty="0" smtClean="0"/>
+              <a:t>, (</a:t>
+            </a:r>
+            <a:r>
+              <a:rPr lang="en-US" sz="2300" dirty="0" err="1" smtClean="0"/>
+              <a:t>ngram</a:t>
+            </a:r>
+            <a:r>
+              <a:rPr lang="en-US" sz="2300" dirty="0" smtClean="0"/>
+              <a:t>) </a:t>
+            </a:r>
+            <a:r>
+              <a:rPr lang="en-US" sz="2300" dirty="0" err="1" smtClean="0"/>
+              <a:t>tokenizers</a:t>
+            </a:r>
+            <a:endParaRPr lang="en-US" sz="2300" dirty="0" smtClean="0"/>
+          </a:p>
+          <a:p>
             <a:pPr marL="1085850" lvl="1" indent="-342900">
               <a:buFont typeface="Arial"/>
               <a:buChar char="•"/>
@@ -4060,37 +4244,6 @@
               <a:rPr lang="en-US" sz="2300" dirty="0" smtClean="0"/>
               <a:t>aliases</a:t>
             </a:r>
-          </a:p>
-          <a:p>
-            <a:pPr marL="1085850" lvl="1" indent="-342900">
-              <a:buFont typeface="Arial"/>
-              <a:buChar char="•"/>
-            </a:pPr>
-            <a:r>
-              <a:rPr lang="en-US" sz="2300" dirty="0" smtClean="0"/>
-              <a:t>scale up and down</a:t>
-            </a:r>
-          </a:p>
-          <a:p>
-            <a:pPr marL="1085850" lvl="1" indent="-342900">
-              <a:buFont typeface="Arial"/>
-              <a:buChar char="•"/>
-            </a:pPr>
-            <a:r>
-              <a:rPr lang="en-US" sz="2300" dirty="0" smtClean="0"/>
-              <a:t>shards, replicas</a:t>
-            </a:r>
-          </a:p>
-          <a:p>
-            <a:pPr marL="342900" indent="-342900">
-              <a:buFont typeface="Arial"/>
-              <a:buChar char="•"/>
-            </a:pPr>
-            <a:r>
-              <a:rPr lang="en-US" sz="2000" dirty="0" smtClean="0"/>
-              <a:t>Templates</a:t>
-            </a:r>
-            <a:endParaRPr lang="en-US" sz="2000" dirty="0" smtClean="0"/>
           </a:p>
         </p:txBody>
       </p:sp>
@@ -4123,6 +4276,226 @@
     <p:extLst>
       <p:ext uri="{BB962C8B-B14F-4D97-AF65-F5344CB8AC3E}">
         <p14:creationId xmlns:p14="http://schemas.microsoft.com/office/powerpoint/2010/main" val="2082814849"/>
+      </p:ext>
+    </p:extLst>
+  </p:cSld>
+  <p:clrMapOvr>
+    <a:masterClrMapping/>
+  </p:clrMapOvr>
+  <p:timing>
+    <p:tnLst>
+      <p:par>
+        <p:cTn xmlns:p14="http://schemas.microsoft.com/office/powerpoint/2010/main" id="1" dur="indefinite" restart="never" nodeType="tmRoot"/>
+      </p:par>
+    </p:tnLst>
+  </p:timing>
+</p:sld>
+</file>
+
+<file path=ppt/slides/slide11.xml><?xml version="1.0" encoding="utf-8"?>
+<p:sld xmlns:a="http://schemas.openxmlformats.org/drawingml/2006/main" xmlns:r="http://schemas.openxmlformats.org/officeDocument/2006/relationships" xmlns:p="http://schemas.openxmlformats.org/presentationml/2006/main">
+  <p:cSld>
+    <p:spTree>
+      <p:nvGrpSpPr>
+        <p:cNvPr id="1" name=""/>
+        <p:cNvGrpSpPr/>
+        <p:nvPr/>
+      </p:nvGrpSpPr>
+      <p:grpSpPr>
+        <a:xfrm>
+          <a:off x="0" y="0"/>
+          <a:ext cx="0" cy="0"/>
+          <a:chOff x="0" y="0"/>
+          <a:chExt cx="0" cy="0"/>
+        </a:xfrm>
+      </p:grpSpPr>
+      <p:sp>
+        <p:nvSpPr>
+          <p:cNvPr id="2" name="Titel 1"/>
+          <p:cNvSpPr>
+            <a:spLocks noGrp="1"/>
+          </p:cNvSpPr>
+          <p:nvPr>
+            <p:ph type="title"/>
+          </p:nvPr>
+        </p:nvSpPr>
+        <p:spPr/>
+        <p:txBody>
+          <a:bodyPr/>
+          <a:lstStyle/>
+          <a:p>
+            <a:r>
+              <a:rPr lang="en-US" dirty="0" smtClean="0"/>
+              <a:t>Example system, the making continued..</a:t>
+            </a:r>
+            <a:endParaRPr lang="en-US" dirty="0"/>
+          </a:p>
+        </p:txBody>
+      </p:sp>
+      <p:sp>
+        <p:nvSpPr>
+          <p:cNvPr id="4" name="Tijdelijke aanduiding voor inhoud 3"/>
+          <p:cNvSpPr>
+            <a:spLocks noGrp="1"/>
+          </p:cNvSpPr>
+          <p:nvPr>
+            <p:ph sz="quarter" idx="11"/>
+          </p:nvPr>
+        </p:nvSpPr>
+        <p:spPr/>
+        <p:txBody>
+          <a:bodyPr/>
+          <a:lstStyle/>
+          <a:p>
+            <a:r>
+              <a:rPr lang="en-US" dirty="0" err="1" smtClean="0"/>
+              <a:t>Elasticsearch</a:t>
+            </a:r>
+            <a:r>
+              <a:rPr lang="en-US" dirty="0" smtClean="0"/>
+              <a:t> </a:t>
+            </a:r>
+            <a:r>
+              <a:rPr lang="en-US" dirty="0" err="1" smtClean="0"/>
+              <a:t>Meetup</a:t>
+            </a:r>
+            <a:endParaRPr lang="en-US" dirty="0"/>
+          </a:p>
+        </p:txBody>
+      </p:sp>
+      <p:sp>
+        <p:nvSpPr>
+          <p:cNvPr id="5" name="Tijdelijke aanduiding voor tekst 4"/>
+          <p:cNvSpPr>
+            <a:spLocks noGrp="1"/>
+          </p:cNvSpPr>
+          <p:nvPr>
+            <p:ph type="body" sz="quarter" idx="12"/>
+          </p:nvPr>
+        </p:nvSpPr>
+        <p:spPr>
+          <a:xfrm>
+            <a:off x="3936000" y="1881248"/>
+            <a:ext cx="8136664" cy="3780000"/>
+          </a:xfrm>
+        </p:spPr>
+        <p:txBody>
+          <a:bodyPr/>
+          <a:lstStyle/>
+          <a:p>
+            <a:pPr marL="342900" indent="-342900">
+              <a:buFont typeface="Arial"/>
+              <a:buChar char="•"/>
+            </a:pPr>
+            <a:r>
+              <a:rPr lang="en-US" sz="2000" dirty="0" smtClean="0"/>
+              <a:t>High Availability</a:t>
+            </a:r>
+            <a:endParaRPr lang="en-US" sz="2000" dirty="0" smtClean="0"/>
+          </a:p>
+          <a:p>
+            <a:pPr marL="1085850" lvl="1" indent="-342900">
+              <a:buFont typeface="Arial"/>
+              <a:buChar char="•"/>
+            </a:pPr>
+            <a:r>
+              <a:rPr lang="en-US" sz="2300" dirty="0" smtClean="0"/>
+              <a:t>scale up and down</a:t>
+            </a:r>
+          </a:p>
+          <a:p>
+            <a:pPr marL="1085850" lvl="1" indent="-342900">
+              <a:buFont typeface="Arial"/>
+              <a:buChar char="•"/>
+            </a:pPr>
+            <a:r>
+              <a:rPr lang="en-US" sz="2300" dirty="0" smtClean="0"/>
+              <a:t>shards, replicas</a:t>
+            </a:r>
+          </a:p>
+          <a:p>
+            <a:pPr marL="342900" indent="-342900">
+              <a:buFont typeface="Arial"/>
+              <a:buChar char="•"/>
+            </a:pPr>
+            <a:r>
+              <a:rPr lang="en-US" sz="2000" dirty="0" smtClean="0"/>
+              <a:t>Time series</a:t>
+            </a:r>
+          </a:p>
+          <a:p>
+            <a:pPr marL="1085850" lvl="1" indent="-342900">
+              <a:buFont typeface="Arial"/>
+              <a:buChar char="•"/>
+            </a:pPr>
+            <a:r>
+              <a:rPr lang="en-US" sz="2300" dirty="0" smtClean="0"/>
+              <a:t>Multi index syntax</a:t>
+            </a:r>
+          </a:p>
+          <a:p>
+            <a:pPr marL="1085850" lvl="1" indent="-342900">
+              <a:buFont typeface="Arial"/>
+              <a:buChar char="•"/>
+            </a:pPr>
+            <a:r>
+              <a:rPr lang="en-US" sz="2300" dirty="0" smtClean="0"/>
+              <a:t>Date math</a:t>
+            </a:r>
+            <a:endParaRPr lang="en-US" sz="2300" dirty="0" smtClean="0"/>
+          </a:p>
+          <a:p>
+            <a:pPr marL="1085850" lvl="1" indent="-342900">
+              <a:buFont typeface="Arial"/>
+              <a:buChar char="•"/>
+            </a:pPr>
+            <a:r>
+              <a:rPr lang="en-US" sz="2300" dirty="0" smtClean="0"/>
+              <a:t>Templates</a:t>
+            </a:r>
+          </a:p>
+          <a:p>
+            <a:pPr marL="1085850" lvl="1" indent="-342900">
+              <a:buFont typeface="Arial"/>
+              <a:buChar char="•"/>
+            </a:pPr>
+            <a:r>
+              <a:rPr lang="en-US" sz="2300" dirty="0" smtClean="0"/>
+              <a:t>Calculate period per index</a:t>
+            </a:r>
+            <a:endParaRPr lang="en-US" sz="2300" dirty="0" smtClean="0"/>
+          </a:p>
+        </p:txBody>
+      </p:sp>
+      <p:pic>
+        <p:nvPicPr>
+          <p:cNvPr id="10" name="Tijdelijke aanduiding voor afbeelding 8" descr="filmstrip.jpg"/>
+          <p:cNvPicPr>
+            <a:picLocks noGrp="1" noChangeAspect="1"/>
+          </p:cNvPicPr>
+          <p:nvPr>
+            <p:ph type="pic" idx="10"/>
+          </p:nvPr>
+        </p:nvPicPr>
+        <p:blipFill>
+          <a:blip r:embed="rId3" cstate="print">
+            <a:extLst>
+              <a:ext uri="{28A0092B-C50C-407E-A947-70E740481C1C}">
+                <a14:useLocalDpi xmlns:a14="http://schemas.microsoft.com/office/drawing/2010/main"/>
+              </a:ext>
+            </a:extLst>
+          </a:blip>
+          <a:srcRect/>
+          <a:stretch>
+            <a:fillRect/>
+          </a:stretch>
+        </p:blipFill>
+        <p:spPr/>
+      </p:pic>
+    </p:spTree>
+    <p:extLst>
+      <p:ext uri="{BB962C8B-B14F-4D97-AF65-F5344CB8AC3E}">
+        <p14:creationId xmlns:p14="http://schemas.microsoft.com/office/powerpoint/2010/main" val="1128842092"/>
       </p:ext>
     </p:extLst>
   </p:cSld>
@@ -6407,7 +6780,6 @@
               <a:rPr lang="en-US" sz="2000" dirty="0" smtClean="0"/>
               <a:t> (packages)</a:t>
             </a:r>
-            <a:endParaRPr lang="en-US" sz="2000" dirty="0" smtClean="0"/>
           </a:p>
           <a:p>
             <a:pPr marL="342900" indent="-342900">
@@ -6426,11 +6798,7 @@
             </a:pPr>
             <a:r>
               <a:rPr lang="en-US" sz="2300" dirty="0" smtClean="0"/>
-              <a:t>(H2) </a:t>
-            </a:r>
-            <a:r>
-              <a:rPr lang="en-US" sz="2300" dirty="0" smtClean="0"/>
-              <a:t>database</a:t>
+              <a:t>(H2) database</a:t>
             </a:r>
           </a:p>
           <a:p>
@@ -6448,15 +6816,7 @@
             </a:r>
             <a:r>
               <a:rPr lang="en-US" sz="2300" dirty="0" smtClean="0"/>
-              <a:t> as) </a:t>
-            </a:r>
-            <a:r>
-              <a:rPr lang="en-US" sz="2300" dirty="0" smtClean="0"/>
-              <a:t>database </a:t>
-            </a:r>
-            <a:r>
-              <a:rPr lang="en-US" sz="2300" dirty="0" smtClean="0"/>
-              <a:t>client</a:t>
+              <a:t> as) database client</a:t>
             </a:r>
           </a:p>
           <a:p>

</xml_diff>

<commit_message>
updated ppt, tuned some DSL commands, added lowercase and asciifolding
</commit_message>
<xml_diff>
--- a/presentation/Elasticsearch-meetup-2019-03.pptx
+++ b/presentation/Elasticsearch-meetup-2019-03.pptx
@@ -281,7 +281,7 @@
               <a:pPr>
                 <a:defRPr/>
               </a:pPr>
-              <a:t>15-4-2019</a:t>
+              <a:t>17-4-2019</a:t>
             </a:fld>
             <a:endParaRPr lang="nl-NL"/>
           </a:p>
@@ -501,7 +501,7 @@
               <a:pPr>
                 <a:defRPr/>
               </a:pPr>
-              <a:t>15-4-2019</a:t>
+              <a:t>17-4-2019</a:t>
             </a:fld>
             <a:endParaRPr lang="nl-NL"/>
           </a:p>
@@ -4151,11 +4151,11 @@
             </a:r>
             <a:r>
               <a:rPr lang="en-US" sz="2300" dirty="0"/>
-              <a:t>) </a:t>
-            </a:r>
-            <a:r>
-              <a:rPr lang="en-US" sz="2300" dirty="0" err="1"/>
-              <a:t>tokenizers</a:t>
+              <a:t>) tokenizers</a:t>
+            </a:r>
+            <a:r>
+              <a:rPr lang="en-US" sz="2300"/>
+              <a:t>, filters</a:t>
             </a:r>
             <a:endParaRPr lang="en-US" sz="2300" dirty="0"/>
           </a:p>
@@ -6924,15 +6924,24 @@
             </a:pPr>
             <a:r>
               <a:rPr lang="en-US" sz="2000" dirty="0"/>
-              <a:t>Download and install and run </a:t>
-            </a:r>
-            <a:r>
-              <a:rPr lang="en-US" sz="2000" dirty="0" err="1"/>
-              <a:t>Kibana</a:t>
-            </a:r>
+              <a:t>Download and install and run Kibana (done)</a:t>
+            </a:r>
+          </a:p>
+          <a:p>
+            <a:pPr marL="342900" indent="-342900">
+              <a:buFont typeface="Arial"/>
+              <a:buChar char="•"/>
+            </a:pPr>
+            <a:endParaRPr lang="en-US" sz="2000" dirty="0"/>
+          </a:p>
+          <a:p>
+            <a:pPr marL="342900" indent="-342900">
+              <a:buFont typeface="Arial"/>
+              <a:buChar char="•"/>
+            </a:pPr>
             <a:r>
               <a:rPr lang="en-US" sz="2000" dirty="0"/>
-              <a:t> (done)</a:t>
+              <a:t>First contact with Kibana and Elasticsearch…..</a:t>
             </a:r>
           </a:p>
           <a:p>

</xml_diff>